<commit_message>
Update ONIP / FISA / Light illumination cartography subject
</commit_message>
<xml_diff>
--- a/ONIP-FISA/POO_eclairement/ONIP2_Eclairement.pptx
+++ b/ONIP-FISA/POO_eclairement/ONIP2_Eclairement.pptx
@@ -221,7 +221,7 @@
           <a:p>
             <a:fld id="{95F60532-AC81-4152-B45E-E054A978F780}" type="datetimeFigureOut">
               <a:rPr lang="fr-FR" smtClean="0"/>
-              <a:t>31/01/2025</a:t>
+              <a:t>05/02/2025</a:t>
             </a:fld>
             <a:endParaRPr lang="fr-FR"/>
           </a:p>
@@ -1976,7 +1976,7 @@
           <a:p>
             <a:fld id="{02AC24A9-CCB6-4F8D-B8DB-C2F3692CFA5A}" type="datetimeFigureOut">
               <a:rPr lang="en-US" smtClean="0"/>
-              <a:t>1/31/2025</a:t>
+              <a:t>2/5/2025</a:t>
             </a:fld>
             <a:endParaRPr lang="en-US" dirty="0"/>
           </a:p>
@@ -2346,7 +2346,7 @@
           <a:p>
             <a:fld id="{02AC24A9-CCB6-4F8D-B8DB-C2F3692CFA5A}" type="datetimeFigureOut">
               <a:rPr lang="en-US" smtClean="0"/>
-              <a:t>1/31/2025</a:t>
+              <a:t>2/5/2025</a:t>
             </a:fld>
             <a:endParaRPr lang="en-US"/>
           </a:p>
@@ -2555,7 +2555,7 @@
           <a:p>
             <a:fld id="{02AC24A9-CCB6-4F8D-B8DB-C2F3692CFA5A}" type="datetimeFigureOut">
               <a:rPr lang="en-US" smtClean="0"/>
-              <a:t>1/31/2025</a:t>
+              <a:t>2/5/2025</a:t>
             </a:fld>
             <a:endParaRPr lang="en-US"/>
           </a:p>
@@ -3025,7 +3025,7 @@
           <a:p>
             <a:fld id="{02AC24A9-CCB6-4F8D-B8DB-C2F3692CFA5A}" type="datetimeFigureOut">
               <a:rPr lang="en-US" smtClean="0"/>
-              <a:t>1/31/2025</a:t>
+              <a:t>2/5/2025</a:t>
             </a:fld>
             <a:endParaRPr lang="en-US"/>
           </a:p>
@@ -3479,7 +3479,7 @@
           <a:p>
             <a:fld id="{02AC24A9-CCB6-4F8D-B8DB-C2F3692CFA5A}" type="datetimeFigureOut">
               <a:rPr lang="en-US" smtClean="0"/>
-              <a:t>1/31/2025</a:t>
+              <a:t>2/5/2025</a:t>
             </a:fld>
             <a:endParaRPr lang="en-US"/>
           </a:p>
@@ -4011,7 +4011,7 @@
           <a:p>
             <a:fld id="{02AC24A9-CCB6-4F8D-B8DB-C2F3692CFA5A}" type="datetimeFigureOut">
               <a:rPr lang="en-US" smtClean="0"/>
-              <a:t>1/31/2025</a:t>
+              <a:t>2/5/2025</a:t>
             </a:fld>
             <a:endParaRPr lang="en-US"/>
           </a:p>
@@ -4710,7 +4710,7 @@
           <a:p>
             <a:fld id="{02AC24A9-CCB6-4F8D-B8DB-C2F3692CFA5A}" type="datetimeFigureOut">
               <a:rPr lang="en-US" smtClean="0"/>
-              <a:t>1/31/2025</a:t>
+              <a:t>2/5/2025</a:t>
             </a:fld>
             <a:endParaRPr lang="en-US"/>
           </a:p>
@@ -5039,7 +5039,7 @@
           <a:p>
             <a:fld id="{02AC24A9-CCB6-4F8D-B8DB-C2F3692CFA5A}" type="datetimeFigureOut">
               <a:rPr lang="en-US" smtClean="0"/>
-              <a:t>1/31/2025</a:t>
+              <a:t>2/5/2025</a:t>
             </a:fld>
             <a:endParaRPr lang="en-US"/>
           </a:p>
@@ -5152,7 +5152,7 @@
           <a:p>
             <a:fld id="{02AC24A9-CCB6-4F8D-B8DB-C2F3692CFA5A}" type="datetimeFigureOut">
               <a:rPr lang="en-US" smtClean="0"/>
-              <a:t>1/31/2025</a:t>
+              <a:t>2/5/2025</a:t>
             </a:fld>
             <a:endParaRPr lang="en-US"/>
           </a:p>
@@ -5647,7 +5647,7 @@
           <a:p>
             <a:fld id="{02AC24A9-CCB6-4F8D-B8DB-C2F3692CFA5A}" type="datetimeFigureOut">
               <a:rPr lang="en-US" smtClean="0"/>
-              <a:t>1/31/2025</a:t>
+              <a:t>2/5/2025</a:t>
             </a:fld>
             <a:endParaRPr lang="en-US" dirty="0"/>
           </a:p>
@@ -6124,7 +6124,7 @@
           <a:p>
             <a:fld id="{02AC24A9-CCB6-4F8D-B8DB-C2F3692CFA5A}" type="datetimeFigureOut">
               <a:rPr lang="en-US" smtClean="0"/>
-              <a:t>1/31/2025</a:t>
+              <a:t>2/5/2025</a:t>
             </a:fld>
             <a:endParaRPr lang="en-US"/>
           </a:p>
@@ -6367,7 +6367,7 @@
           <a:p>
             <a:fld id="{02AC24A9-CCB6-4F8D-B8DB-C2F3692CFA5A}" type="datetimeFigureOut">
               <a:rPr lang="en-US" smtClean="0"/>
-              <a:t>1/31/2025</a:t>
+              <a:t>2/5/2025</a:t>
             </a:fld>
             <a:endParaRPr lang="en-US"/>
           </a:p>
@@ -8073,10 +8073,10 @@
       </p:sp>
       <p:pic>
         <p:nvPicPr>
-          <p:cNvPr id="14" name="Image 13" descr="Une image contenant diagramme, texte, capture d’écran, ligne&#10;&#10;Description générée automatiquement">
-            <a:extLst>
-              <a:ext uri="{FF2B5EF4-FFF2-40B4-BE49-F238E27FC236}">
-                <a16:creationId xmlns:a16="http://schemas.microsoft.com/office/drawing/2014/main" id="{D6C864A5-584E-859D-B43D-83CFCACB1F40}"/>
+          <p:cNvPr id="9" name="Image 8">
+            <a:extLst>
+              <a:ext uri="{FF2B5EF4-FFF2-40B4-BE49-F238E27FC236}">
+                <a16:creationId xmlns:a16="http://schemas.microsoft.com/office/drawing/2014/main" id="{4DD8575C-D9B9-952C-4231-0DB9D02E7A90}"/>
               </a:ext>
             </a:extLst>
           </p:cNvPr>
@@ -8086,21 +8086,183 @@
           <p:nvPr/>
         </p:nvPicPr>
         <p:blipFill>
-          <a:blip r:embed="rId4">
-            <a:extLst>
-              <a:ext uri="{28A0092B-C50C-407E-A947-70E740481C1C}">
-                <a14:useLocalDpi xmlns:a14="http://schemas.microsoft.com/office/drawing/2010/main" val="0"/>
-              </a:ext>
-            </a:extLst>
-          </a:blip>
+          <a:blip r:embed="rId4"/>
           <a:stretch>
             <a:fillRect/>
           </a:stretch>
         </p:blipFill>
         <p:spPr>
           <a:xfrm>
-            <a:off x="4506879" y="2393488"/>
-            <a:ext cx="7463362" cy="3550111"/>
+            <a:off x="4941869" y="2736041"/>
+            <a:ext cx="5934220" cy="2919712"/>
+          </a:xfrm>
+          <a:prstGeom prst="rect">
+            <a:avLst/>
+          </a:prstGeom>
+        </p:spPr>
+      </p:pic>
+      <p:sp>
+        <p:nvSpPr>
+          <p:cNvPr id="10" name="Rectangle 9">
+            <a:extLst>
+              <a:ext uri="{FF2B5EF4-FFF2-40B4-BE49-F238E27FC236}">
+                <a16:creationId xmlns:a16="http://schemas.microsoft.com/office/drawing/2014/main" id="{8987CFCE-D38D-4AB2-37FC-772ED1D57691}"/>
+              </a:ext>
+            </a:extLst>
+          </p:cNvPr>
+          <p:cNvSpPr/>
+          <p:nvPr/>
+        </p:nvSpPr>
+        <p:spPr>
+          <a:xfrm>
+            <a:off x="4621162" y="5503547"/>
+            <a:ext cx="2202426" cy="286960"/>
+          </a:xfrm>
+          <a:prstGeom prst="rect">
+            <a:avLst/>
+          </a:prstGeom>
+          <a:solidFill>
+            <a:schemeClr val="bg1"/>
+          </a:solidFill>
+          <a:ln>
+            <a:solidFill>
+              <a:schemeClr val="bg1"/>
+            </a:solidFill>
+          </a:ln>
+        </p:spPr>
+        <p:style>
+          <a:lnRef idx="2">
+            <a:schemeClr val="accent1">
+              <a:shade val="15000"/>
+            </a:schemeClr>
+          </a:lnRef>
+          <a:fillRef idx="1">
+            <a:schemeClr val="accent1"/>
+          </a:fillRef>
+          <a:effectRef idx="0">
+            <a:schemeClr val="accent1"/>
+          </a:effectRef>
+          <a:fontRef idx="minor">
+            <a:schemeClr val="lt1"/>
+          </a:fontRef>
+        </p:style>
+        <p:txBody>
+          <a:bodyPr rtlCol="0" anchor="ctr"/>
+          <a:lstStyle/>
+          <a:p>
+            <a:pPr algn="ctr"/>
+            <a:endParaRPr lang="fr-FR"/>
+          </a:p>
+        </p:txBody>
+      </p:sp>
+      <p:sp>
+        <p:nvSpPr>
+          <p:cNvPr id="11" name="Rectangle 10">
+            <a:extLst>
+              <a:ext uri="{FF2B5EF4-FFF2-40B4-BE49-F238E27FC236}">
+                <a16:creationId xmlns:a16="http://schemas.microsoft.com/office/drawing/2014/main" id="{9D3E39E4-0AF9-E9ED-18E8-F4C2EA92A8BB}"/>
+              </a:ext>
+            </a:extLst>
+          </p:cNvPr>
+          <p:cNvSpPr/>
+          <p:nvPr/>
+        </p:nvSpPr>
+        <p:spPr>
+          <a:xfrm>
+            <a:off x="8234516" y="4358089"/>
+            <a:ext cx="2962280" cy="1541266"/>
+          </a:xfrm>
+          <a:prstGeom prst="rect">
+            <a:avLst/>
+          </a:prstGeom>
+          <a:solidFill>
+            <a:schemeClr val="bg1"/>
+          </a:solidFill>
+          <a:ln>
+            <a:solidFill>
+              <a:schemeClr val="bg1"/>
+            </a:solidFill>
+          </a:ln>
+        </p:spPr>
+        <p:style>
+          <a:lnRef idx="2">
+            <a:schemeClr val="accent1">
+              <a:shade val="15000"/>
+            </a:schemeClr>
+          </a:lnRef>
+          <a:fillRef idx="1">
+            <a:schemeClr val="accent1"/>
+          </a:fillRef>
+          <a:effectRef idx="0">
+            <a:schemeClr val="accent1"/>
+          </a:effectRef>
+          <a:fontRef idx="minor">
+            <a:schemeClr val="lt1"/>
+          </a:fontRef>
+        </p:style>
+        <p:txBody>
+          <a:bodyPr rtlCol="0" anchor="ctr"/>
+          <a:lstStyle/>
+          <a:p>
+            <a:pPr algn="ctr"/>
+            <a:endParaRPr lang="fr-FR"/>
+          </a:p>
+        </p:txBody>
+      </p:sp>
+      <p:pic>
+        <p:nvPicPr>
+          <p:cNvPr id="15" name="Image 14">
+            <a:extLst>
+              <a:ext uri="{FF2B5EF4-FFF2-40B4-BE49-F238E27FC236}">
+                <a16:creationId xmlns:a16="http://schemas.microsoft.com/office/drawing/2014/main" id="{39135CAF-CEA6-70D2-FB6F-2FE19F723967}"/>
+              </a:ext>
+            </a:extLst>
+          </p:cNvPr>
+          <p:cNvPicPr>
+            <a:picLocks noChangeAspect="1"/>
+          </p:cNvPicPr>
+          <p:nvPr/>
+        </p:nvPicPr>
+        <p:blipFill>
+          <a:blip r:embed="rId5"/>
+          <a:stretch>
+            <a:fillRect/>
+          </a:stretch>
+        </p:blipFill>
+        <p:spPr>
+          <a:xfrm>
+            <a:off x="6096000" y="5827676"/>
+            <a:ext cx="4983912" cy="685859"/>
+          </a:xfrm>
+          <a:prstGeom prst="rect">
+            <a:avLst/>
+          </a:prstGeom>
+        </p:spPr>
+      </p:pic>
+      <p:pic>
+        <p:nvPicPr>
+          <p:cNvPr id="16" name="Image 15">
+            <a:extLst>
+              <a:ext uri="{FF2B5EF4-FFF2-40B4-BE49-F238E27FC236}">
+                <a16:creationId xmlns:a16="http://schemas.microsoft.com/office/drawing/2014/main" id="{85A15BE2-700C-1896-19A7-3E07DA0C31C5}"/>
+              </a:ext>
+            </a:extLst>
+          </p:cNvPr>
+          <p:cNvPicPr>
+            <a:picLocks noChangeAspect="1"/>
+          </p:cNvPicPr>
+          <p:nvPr/>
+        </p:nvPicPr>
+        <p:blipFill>
+          <a:blip r:embed="rId6"/>
+          <a:stretch>
+            <a:fillRect/>
+          </a:stretch>
+        </p:blipFill>
+        <p:spPr>
+          <a:xfrm>
+            <a:off x="8587956" y="4824548"/>
+            <a:ext cx="2404024" cy="868374"/>
           </a:xfrm>
           <a:prstGeom prst="rect">
             <a:avLst/>
@@ -18706,10 +18868,10 @@
       </p:sp>
       <p:pic>
         <p:nvPicPr>
-          <p:cNvPr id="14" name="Image 13" descr="Une image contenant diagramme, texte, capture d’écran, ligne&#10;&#10;Description générée automatiquement">
-            <a:extLst>
-              <a:ext uri="{FF2B5EF4-FFF2-40B4-BE49-F238E27FC236}">
-                <a16:creationId xmlns:a16="http://schemas.microsoft.com/office/drawing/2014/main" id="{523DC79A-53FE-3D5D-BE77-190A9C1406AD}"/>
+          <p:cNvPr id="10" name="Image 9">
+            <a:extLst>
+              <a:ext uri="{FF2B5EF4-FFF2-40B4-BE49-F238E27FC236}">
+                <a16:creationId xmlns:a16="http://schemas.microsoft.com/office/drawing/2014/main" id="{998E5140-6B94-62BE-CCCB-03CA14988542}"/>
               </a:ext>
             </a:extLst>
           </p:cNvPr>
@@ -18719,21 +18881,15 @@
           <p:nvPr/>
         </p:nvPicPr>
         <p:blipFill>
-          <a:blip r:embed="rId4">
-            <a:extLst>
-              <a:ext uri="{28A0092B-C50C-407E-A947-70E740481C1C}">
-                <a14:useLocalDpi xmlns:a14="http://schemas.microsoft.com/office/drawing/2010/main" val="0"/>
-              </a:ext>
-            </a:extLst>
-          </a:blip>
+          <a:blip r:embed="rId4"/>
           <a:stretch>
             <a:fillRect/>
           </a:stretch>
         </p:blipFill>
         <p:spPr>
           <a:xfrm>
-            <a:off x="6096000" y="2186738"/>
-            <a:ext cx="10493649" cy="4991533"/>
+            <a:off x="6571935" y="2735299"/>
+            <a:ext cx="3057832" cy="3192242"/>
           </a:xfrm>
           <a:prstGeom prst="rect">
             <a:avLst/>
@@ -18776,42 +18932,6 @@
           <a:chExt cx="0" cy="0"/>
         </a:xfrm>
       </p:grpSpPr>
-      <p:pic>
-        <p:nvPicPr>
-          <p:cNvPr id="14" name="Image 13" descr="Une image contenant diagramme, texte, capture d’écran, ligne&#10;&#10;Description générée automatiquement">
-            <a:extLst>
-              <a:ext uri="{FF2B5EF4-FFF2-40B4-BE49-F238E27FC236}">
-                <a16:creationId xmlns:a16="http://schemas.microsoft.com/office/drawing/2014/main" id="{0D9EC093-BC1C-AE4A-F668-D267943DF463}"/>
-              </a:ext>
-            </a:extLst>
-          </p:cNvPr>
-          <p:cNvPicPr>
-            <a:picLocks noChangeAspect="1"/>
-          </p:cNvPicPr>
-          <p:nvPr/>
-        </p:nvPicPr>
-        <p:blipFill>
-          <a:blip r:embed="rId3">
-            <a:extLst>
-              <a:ext uri="{28A0092B-C50C-407E-A947-70E740481C1C}">
-                <a14:useLocalDpi xmlns:a14="http://schemas.microsoft.com/office/drawing/2010/main" val="0"/>
-              </a:ext>
-            </a:extLst>
-          </a:blip>
-          <a:stretch>
-            <a:fillRect/>
-          </a:stretch>
-        </p:blipFill>
-        <p:spPr>
-          <a:xfrm>
-            <a:off x="619125" y="1718402"/>
-            <a:ext cx="10493649" cy="4991533"/>
-          </a:xfrm>
-          <a:prstGeom prst="rect">
-            <a:avLst/>
-          </a:prstGeom>
-        </p:spPr>
-      </p:pic>
       <p:sp>
         <p:nvSpPr>
           <p:cNvPr id="3" name="Rectangle 2">
@@ -18877,58 +18997,6 @@
       </p:sp>
       <p:sp>
         <p:nvSpPr>
-          <p:cNvPr id="9" name="Rectangle 8">
-            <a:extLst>
-              <a:ext uri="{FF2B5EF4-FFF2-40B4-BE49-F238E27FC236}">
-                <a16:creationId xmlns:a16="http://schemas.microsoft.com/office/drawing/2014/main" id="{32E3A8B9-2945-FAAF-EED7-9D00303E3895}"/>
-              </a:ext>
-            </a:extLst>
-          </p:cNvPr>
-          <p:cNvSpPr/>
-          <p:nvPr/>
-        </p:nvSpPr>
-        <p:spPr>
-          <a:xfrm>
-            <a:off x="673975" y="1718402"/>
-            <a:ext cx="5921058" cy="4991533"/>
-          </a:xfrm>
-          <a:prstGeom prst="rect">
-            <a:avLst/>
-          </a:prstGeom>
-          <a:solidFill>
-            <a:schemeClr val="bg1"/>
-          </a:solidFill>
-          <a:ln>
-            <a:noFill/>
-          </a:ln>
-        </p:spPr>
-        <p:style>
-          <a:lnRef idx="2">
-            <a:schemeClr val="accent1">
-              <a:shade val="15000"/>
-            </a:schemeClr>
-          </a:lnRef>
-          <a:fillRef idx="1">
-            <a:schemeClr val="accent1"/>
-          </a:fillRef>
-          <a:effectRef idx="0">
-            <a:schemeClr val="accent1"/>
-          </a:effectRef>
-          <a:fontRef idx="minor">
-            <a:schemeClr val="lt1"/>
-          </a:fontRef>
-        </p:style>
-        <p:txBody>
-          <a:bodyPr rtlCol="0" anchor="ctr"/>
-          <a:lstStyle/>
-          <a:p>
-            <a:pPr algn="ctr"/>
-            <a:endParaRPr lang="fr-FR"/>
-          </a:p>
-        </p:txBody>
-      </p:sp>
-      <p:sp>
-        <p:nvSpPr>
           <p:cNvPr id="2" name="Titre 1">
             <a:extLst>
               <a:ext uri="{FF2B5EF4-FFF2-40B4-BE49-F238E27FC236}">
@@ -19053,7 +19121,7 @@
           <p:nvPr/>
         </p:nvPicPr>
         <p:blipFill>
-          <a:blip r:embed="rId4" cstate="print">
+          <a:blip r:embed="rId3" cstate="print">
             <a:extLst>
               <a:ext uri="{28A0092B-C50C-407E-A947-70E740481C1C}">
                 <a14:useLocalDpi xmlns:a14="http://schemas.microsoft.com/office/drawing/2010/main" val="0"/>
@@ -19472,6 +19540,204 @@
           </a:p>
         </p:txBody>
       </p:sp>
+      <p:pic>
+        <p:nvPicPr>
+          <p:cNvPr id="11" name="Image 10">
+            <a:extLst>
+              <a:ext uri="{FF2B5EF4-FFF2-40B4-BE49-F238E27FC236}">
+                <a16:creationId xmlns:a16="http://schemas.microsoft.com/office/drawing/2014/main" id="{7F239CAE-3CB0-27EA-8ADE-7AD7D62082EF}"/>
+              </a:ext>
+            </a:extLst>
+          </p:cNvPr>
+          <p:cNvPicPr>
+            <a:picLocks noChangeAspect="1"/>
+          </p:cNvPicPr>
+          <p:nvPr/>
+        </p:nvPicPr>
+        <p:blipFill>
+          <a:blip r:embed="rId4"/>
+          <a:stretch>
+            <a:fillRect/>
+          </a:stretch>
+        </p:blipFill>
+        <p:spPr>
+          <a:xfrm>
+            <a:off x="4941869" y="2736041"/>
+            <a:ext cx="5934220" cy="2919712"/>
+          </a:xfrm>
+          <a:prstGeom prst="rect">
+            <a:avLst/>
+          </a:prstGeom>
+        </p:spPr>
+      </p:pic>
+      <p:sp>
+        <p:nvSpPr>
+          <p:cNvPr id="12" name="Rectangle 11">
+            <a:extLst>
+              <a:ext uri="{FF2B5EF4-FFF2-40B4-BE49-F238E27FC236}">
+                <a16:creationId xmlns:a16="http://schemas.microsoft.com/office/drawing/2014/main" id="{13D7302A-1F88-0ED8-A942-AB7DAB62FEFB}"/>
+              </a:ext>
+            </a:extLst>
+          </p:cNvPr>
+          <p:cNvSpPr/>
+          <p:nvPr/>
+        </p:nvSpPr>
+        <p:spPr>
+          <a:xfrm>
+            <a:off x="4621162" y="5503547"/>
+            <a:ext cx="2202426" cy="286960"/>
+          </a:xfrm>
+          <a:prstGeom prst="rect">
+            <a:avLst/>
+          </a:prstGeom>
+          <a:solidFill>
+            <a:schemeClr val="bg1"/>
+          </a:solidFill>
+          <a:ln>
+            <a:solidFill>
+              <a:schemeClr val="bg1"/>
+            </a:solidFill>
+          </a:ln>
+        </p:spPr>
+        <p:style>
+          <a:lnRef idx="2">
+            <a:schemeClr val="accent1">
+              <a:shade val="15000"/>
+            </a:schemeClr>
+          </a:lnRef>
+          <a:fillRef idx="1">
+            <a:schemeClr val="accent1"/>
+          </a:fillRef>
+          <a:effectRef idx="0">
+            <a:schemeClr val="accent1"/>
+          </a:effectRef>
+          <a:fontRef idx="minor">
+            <a:schemeClr val="lt1"/>
+          </a:fontRef>
+        </p:style>
+        <p:txBody>
+          <a:bodyPr rtlCol="0" anchor="ctr"/>
+          <a:lstStyle/>
+          <a:p>
+            <a:pPr algn="ctr"/>
+            <a:endParaRPr lang="fr-FR"/>
+          </a:p>
+        </p:txBody>
+      </p:sp>
+      <p:sp>
+        <p:nvSpPr>
+          <p:cNvPr id="15" name="Rectangle 14">
+            <a:extLst>
+              <a:ext uri="{FF2B5EF4-FFF2-40B4-BE49-F238E27FC236}">
+                <a16:creationId xmlns:a16="http://schemas.microsoft.com/office/drawing/2014/main" id="{9B42A188-6A4A-A043-D18D-B6BF07DB680B}"/>
+              </a:ext>
+            </a:extLst>
+          </p:cNvPr>
+          <p:cNvSpPr/>
+          <p:nvPr/>
+        </p:nvSpPr>
+        <p:spPr>
+          <a:xfrm>
+            <a:off x="8234516" y="4358089"/>
+            <a:ext cx="2962280" cy="1541266"/>
+          </a:xfrm>
+          <a:prstGeom prst="rect">
+            <a:avLst/>
+          </a:prstGeom>
+          <a:solidFill>
+            <a:schemeClr val="bg1"/>
+          </a:solidFill>
+          <a:ln>
+            <a:solidFill>
+              <a:schemeClr val="bg1"/>
+            </a:solidFill>
+          </a:ln>
+        </p:spPr>
+        <p:style>
+          <a:lnRef idx="2">
+            <a:schemeClr val="accent1">
+              <a:shade val="15000"/>
+            </a:schemeClr>
+          </a:lnRef>
+          <a:fillRef idx="1">
+            <a:schemeClr val="accent1"/>
+          </a:fillRef>
+          <a:effectRef idx="0">
+            <a:schemeClr val="accent1"/>
+          </a:effectRef>
+          <a:fontRef idx="minor">
+            <a:schemeClr val="lt1"/>
+          </a:fontRef>
+        </p:style>
+        <p:txBody>
+          <a:bodyPr rtlCol="0" anchor="ctr"/>
+          <a:lstStyle/>
+          <a:p>
+            <a:pPr algn="ctr"/>
+            <a:endParaRPr lang="fr-FR"/>
+          </a:p>
+        </p:txBody>
+      </p:sp>
+      <p:pic>
+        <p:nvPicPr>
+          <p:cNvPr id="17" name="Image 16">
+            <a:extLst>
+              <a:ext uri="{FF2B5EF4-FFF2-40B4-BE49-F238E27FC236}">
+                <a16:creationId xmlns:a16="http://schemas.microsoft.com/office/drawing/2014/main" id="{F1D510C7-96A5-19EE-6957-58BD23E1DE1B}"/>
+              </a:ext>
+            </a:extLst>
+          </p:cNvPr>
+          <p:cNvPicPr>
+            <a:picLocks noChangeAspect="1"/>
+          </p:cNvPicPr>
+          <p:nvPr/>
+        </p:nvPicPr>
+        <p:blipFill>
+          <a:blip r:embed="rId5"/>
+          <a:stretch>
+            <a:fillRect/>
+          </a:stretch>
+        </p:blipFill>
+        <p:spPr>
+          <a:xfrm>
+            <a:off x="6096000" y="5827676"/>
+            <a:ext cx="4983912" cy="685859"/>
+          </a:xfrm>
+          <a:prstGeom prst="rect">
+            <a:avLst/>
+          </a:prstGeom>
+        </p:spPr>
+      </p:pic>
+      <p:pic>
+        <p:nvPicPr>
+          <p:cNvPr id="18" name="Image 17">
+            <a:extLst>
+              <a:ext uri="{FF2B5EF4-FFF2-40B4-BE49-F238E27FC236}">
+                <a16:creationId xmlns:a16="http://schemas.microsoft.com/office/drawing/2014/main" id="{8E12CEF7-4261-0792-6ABB-92446A271DCC}"/>
+              </a:ext>
+            </a:extLst>
+          </p:cNvPr>
+          <p:cNvPicPr>
+            <a:picLocks noChangeAspect="1"/>
+          </p:cNvPicPr>
+          <p:nvPr/>
+        </p:nvPicPr>
+        <p:blipFill>
+          <a:blip r:embed="rId6"/>
+          <a:stretch>
+            <a:fillRect/>
+          </a:stretch>
+        </p:blipFill>
+        <p:spPr>
+          <a:xfrm>
+            <a:off x="8587956" y="4824548"/>
+            <a:ext cx="2404024" cy="868374"/>
+          </a:xfrm>
+          <a:prstGeom prst="rect">
+            <a:avLst/>
+          </a:prstGeom>
+        </p:spPr>
+      </p:pic>
     </p:spTree>
     <p:extLst>
       <p:ext uri="{BB962C8B-B14F-4D97-AF65-F5344CB8AC3E}">

</xml_diff>